<commit_message>
minor updates to the PPT
</commit_message>
<xml_diff>
--- a/Project1.pptx
+++ b/Project1.pptx
@@ -22,6 +22,7 @@
     <p:sldId id="271" r:id="rId16"/>
     <p:sldId id="272" r:id="rId17"/>
     <p:sldId id="273" r:id="rId18"/>
+    <p:sldId id="274" r:id="rId19"/>
   </p:sldIdLst>
   <p:sldSz cx="12192000" cy="6858000"/>
   <p:notesSz cx="6858000" cy="9144000"/>
@@ -284,7 +285,7 @@
           <a:p>
             <a:fld id="{02AC24A9-CCB6-4F8D-B8DB-C2F3692CFA5A}" type="datetimeFigureOut">
               <a:rPr lang="en-US" smtClean="0"/>
-              <a:t>5/12/2021</a:t>
+              <a:t>5/19/2021</a:t>
             </a:fld>
             <a:endParaRPr lang="en-US" dirty="0"/>
           </a:p>
@@ -654,7 +655,7 @@
           <a:p>
             <a:fld id="{02AC24A9-CCB6-4F8D-B8DB-C2F3692CFA5A}" type="datetimeFigureOut">
               <a:rPr lang="en-US" smtClean="0"/>
-              <a:t>5/12/2021</a:t>
+              <a:t>5/19/2021</a:t>
             </a:fld>
             <a:endParaRPr lang="en-US"/>
           </a:p>
@@ -863,7 +864,7 @@
           <a:p>
             <a:fld id="{02AC24A9-CCB6-4F8D-B8DB-C2F3692CFA5A}" type="datetimeFigureOut">
               <a:rPr lang="en-US" smtClean="0"/>
-              <a:t>5/12/2021</a:t>
+              <a:t>5/19/2021</a:t>
             </a:fld>
             <a:endParaRPr lang="en-US"/>
           </a:p>
@@ -1333,7 +1334,7 @@
           <a:p>
             <a:fld id="{02AC24A9-CCB6-4F8D-B8DB-C2F3692CFA5A}" type="datetimeFigureOut">
               <a:rPr lang="en-US" smtClean="0"/>
-              <a:t>5/12/2021</a:t>
+              <a:t>5/19/2021</a:t>
             </a:fld>
             <a:endParaRPr lang="en-US"/>
           </a:p>
@@ -1787,7 +1788,7 @@
           <a:p>
             <a:fld id="{02AC24A9-CCB6-4F8D-B8DB-C2F3692CFA5A}" type="datetimeFigureOut">
               <a:rPr lang="en-US" smtClean="0"/>
-              <a:t>5/12/2021</a:t>
+              <a:t>5/19/2021</a:t>
             </a:fld>
             <a:endParaRPr lang="en-US"/>
           </a:p>
@@ -2319,7 +2320,7 @@
           <a:p>
             <a:fld id="{02AC24A9-CCB6-4F8D-B8DB-C2F3692CFA5A}" type="datetimeFigureOut">
               <a:rPr lang="en-US" smtClean="0"/>
-              <a:t>5/12/2021</a:t>
+              <a:t>5/19/2021</a:t>
             </a:fld>
             <a:endParaRPr lang="en-US"/>
           </a:p>
@@ -3018,7 +3019,7 @@
           <a:p>
             <a:fld id="{02AC24A9-CCB6-4F8D-B8DB-C2F3692CFA5A}" type="datetimeFigureOut">
               <a:rPr lang="en-US" smtClean="0"/>
-              <a:t>5/12/2021</a:t>
+              <a:t>5/19/2021</a:t>
             </a:fld>
             <a:endParaRPr lang="en-US"/>
           </a:p>
@@ -3347,7 +3348,7 @@
           <a:p>
             <a:fld id="{02AC24A9-CCB6-4F8D-B8DB-C2F3692CFA5A}" type="datetimeFigureOut">
               <a:rPr lang="en-US" smtClean="0"/>
-              <a:t>5/12/2021</a:t>
+              <a:t>5/19/2021</a:t>
             </a:fld>
             <a:endParaRPr lang="en-US"/>
           </a:p>
@@ -3460,7 +3461,7 @@
           <a:p>
             <a:fld id="{02AC24A9-CCB6-4F8D-B8DB-C2F3692CFA5A}" type="datetimeFigureOut">
               <a:rPr lang="en-US" smtClean="0"/>
-              <a:t>5/12/2021</a:t>
+              <a:t>5/19/2021</a:t>
             </a:fld>
             <a:endParaRPr lang="en-US"/>
           </a:p>
@@ -3955,7 +3956,7 @@
           <a:p>
             <a:fld id="{02AC24A9-CCB6-4F8D-B8DB-C2F3692CFA5A}" type="datetimeFigureOut">
               <a:rPr lang="en-US" smtClean="0"/>
-              <a:t>5/12/2021</a:t>
+              <a:t>5/19/2021</a:t>
             </a:fld>
             <a:endParaRPr lang="en-US" dirty="0"/>
           </a:p>
@@ -4432,7 +4433,7 @@
           <a:p>
             <a:fld id="{02AC24A9-CCB6-4F8D-B8DB-C2F3692CFA5A}" type="datetimeFigureOut">
               <a:rPr lang="en-US" smtClean="0"/>
-              <a:t>5/12/2021</a:t>
+              <a:t>5/19/2021</a:t>
             </a:fld>
             <a:endParaRPr lang="en-US"/>
           </a:p>
@@ -4675,7 +4676,7 @@
           <a:p>
             <a:fld id="{02AC24A9-CCB6-4F8D-B8DB-C2F3692CFA5A}" type="datetimeFigureOut">
               <a:rPr lang="en-US" smtClean="0"/>
-              <a:t>5/12/2021</a:t>
+              <a:t>5/19/2021</a:t>
             </a:fld>
             <a:endParaRPr lang="en-US"/>
           </a:p>
@@ -9667,6 +9668,106 @@
 </p:sld>
 </file>
 
+<file path=ppt/slides/slide18.xml><?xml version="1.0" encoding="utf-8"?>
+<p:sld xmlns:a="http://schemas.openxmlformats.org/drawingml/2006/main" xmlns:r="http://schemas.openxmlformats.org/officeDocument/2006/relationships" xmlns:p="http://schemas.openxmlformats.org/presentationml/2006/main">
+  <p:cSld>
+    <p:spTree>
+      <p:nvGrpSpPr>
+        <p:cNvPr id="1" name=""/>
+        <p:cNvGrpSpPr/>
+        <p:nvPr/>
+      </p:nvGrpSpPr>
+      <p:grpSpPr>
+        <a:xfrm>
+          <a:off x="0" y="0"/>
+          <a:ext cx="0" cy="0"/>
+          <a:chOff x="0" y="0"/>
+          <a:chExt cx="0" cy="0"/>
+        </a:xfrm>
+      </p:grpSpPr>
+      <p:sp>
+        <p:nvSpPr>
+          <p:cNvPr id="2" name="Title 1">
+            <a:extLst>
+              <a:ext uri="{FF2B5EF4-FFF2-40B4-BE49-F238E27FC236}">
+                <a16:creationId xmlns:a16="http://schemas.microsoft.com/office/drawing/2014/main" id="{AAFDEA3A-1B85-4217-9242-A0A2F6303D9C}"/>
+              </a:ext>
+            </a:extLst>
+          </p:cNvPr>
+          <p:cNvSpPr>
+            <a:spLocks noGrp="1"/>
+          </p:cNvSpPr>
+          <p:nvPr>
+            <p:ph type="title"/>
+          </p:nvPr>
+        </p:nvSpPr>
+        <p:spPr/>
+        <p:txBody>
+          <a:bodyPr/>
+          <a:lstStyle/>
+          <a:p>
+            <a:r>
+              <a:rPr lang="en-US" dirty="0"/>
+              <a:t>☕ Thank you!</a:t>
+            </a:r>
+          </a:p>
+        </p:txBody>
+      </p:sp>
+      <p:sp>
+        <p:nvSpPr>
+          <p:cNvPr id="3" name="Content Placeholder 2">
+            <a:extLst>
+              <a:ext uri="{FF2B5EF4-FFF2-40B4-BE49-F238E27FC236}">
+                <a16:creationId xmlns:a16="http://schemas.microsoft.com/office/drawing/2014/main" id="{24E2C7A3-E749-4871-AB6C-DABE553CF5D0}"/>
+              </a:ext>
+            </a:extLst>
+          </p:cNvPr>
+          <p:cNvSpPr>
+            <a:spLocks noGrp="1"/>
+          </p:cNvSpPr>
+          <p:nvPr>
+            <p:ph idx="1"/>
+          </p:nvPr>
+        </p:nvSpPr>
+        <p:spPr>
+          <a:xfrm>
+            <a:off x="515492" y="2458974"/>
+            <a:ext cx="10838307" cy="3694176"/>
+          </a:xfrm>
+        </p:spPr>
+        <p:txBody>
+          <a:bodyPr>
+            <a:normAutofit/>
+          </a:bodyPr>
+          <a:lstStyle/>
+          <a:p>
+            <a:r>
+              <a:rPr lang="en-US" sz="2400"/>
+              <a:t>Any questions or </a:t>
+            </a:r>
+            <a:r>
+              <a:rPr lang="en-US" sz="2400" dirty="0"/>
+              <a:t>comments?</a:t>
+            </a:r>
+            <a:endParaRPr lang="en-US" sz="1700" dirty="0">
+              <a:latin typeface="Lucida Console" panose="020B0609040504020204" pitchFamily="49" charset="0"/>
+            </a:endParaRPr>
+          </a:p>
+        </p:txBody>
+      </p:sp>
+    </p:spTree>
+    <p:extLst>
+      <p:ext uri="{BB962C8B-B14F-4D97-AF65-F5344CB8AC3E}">
+        <p14:creationId xmlns:p14="http://schemas.microsoft.com/office/powerpoint/2010/main" val="1262601130"/>
+      </p:ext>
+    </p:extLst>
+  </p:cSld>
+  <p:clrMapOvr>
+    <a:masterClrMapping/>
+  </p:clrMapOvr>
+</p:sld>
+</file>
+
 <file path=ppt/slides/slide2.xml><?xml version="1.0" encoding="utf-8"?>
 <p:sld xmlns:a="http://schemas.openxmlformats.org/drawingml/2006/main" xmlns:r="http://schemas.openxmlformats.org/officeDocument/2006/relationships" xmlns:p="http://schemas.openxmlformats.org/presentationml/2006/main">
   <p:cSld>

</xml_diff>